<commit_message>
Login background wallpaper update
</commit_message>
<xml_diff>
--- a/assets/dashboard-icon.pptx
+++ b/assets/dashboard-icon.pptx
@@ -104,6 +104,11 @@
       </a:defRPr>
     </a:lvl9pPr>
   </p:defaultTextStyle>
+  <p:extLst>
+    <p:ext uri="{EFAFB233-063F-42B5-8137-9DF3F51BA10A}">
+      <p15:sldGuideLst xmlns:p15="http://schemas.microsoft.com/office/powerpoint/2012/main"/>
+    </p:ext>
+  </p:extLst>
 </p:presentation>
 </file>
 
@@ -254,7 +259,7 @@
           <a:p>
             <a:fld id="{2C3F5B8C-C339-43AD-9401-4981FE7E4CA6}" type="datetimeFigureOut">
               <a:rPr lang="en-US" smtClean="0"/>
-              <a:t>9/5/2021</a:t>
+              <a:t>9/12/2021</a:t>
             </a:fld>
             <a:endParaRPr lang="en-US"/>
           </a:p>
@@ -452,7 +457,7 @@
           <a:p>
             <a:fld id="{2C3F5B8C-C339-43AD-9401-4981FE7E4CA6}" type="datetimeFigureOut">
               <a:rPr lang="en-US" smtClean="0"/>
-              <a:t>9/5/2021</a:t>
+              <a:t>9/12/2021</a:t>
             </a:fld>
             <a:endParaRPr lang="en-US"/>
           </a:p>
@@ -660,7 +665,7 @@
           <a:p>
             <a:fld id="{2C3F5B8C-C339-43AD-9401-4981FE7E4CA6}" type="datetimeFigureOut">
               <a:rPr lang="en-US" smtClean="0"/>
-              <a:t>9/5/2021</a:t>
+              <a:t>9/12/2021</a:t>
             </a:fld>
             <a:endParaRPr lang="en-US"/>
           </a:p>
@@ -858,7 +863,7 @@
           <a:p>
             <a:fld id="{2C3F5B8C-C339-43AD-9401-4981FE7E4CA6}" type="datetimeFigureOut">
               <a:rPr lang="en-US" smtClean="0"/>
-              <a:t>9/5/2021</a:t>
+              <a:t>9/12/2021</a:t>
             </a:fld>
             <a:endParaRPr lang="en-US"/>
           </a:p>
@@ -1133,7 +1138,7 @@
           <a:p>
             <a:fld id="{2C3F5B8C-C339-43AD-9401-4981FE7E4CA6}" type="datetimeFigureOut">
               <a:rPr lang="en-US" smtClean="0"/>
-              <a:t>9/5/2021</a:t>
+              <a:t>9/12/2021</a:t>
             </a:fld>
             <a:endParaRPr lang="en-US"/>
           </a:p>
@@ -1398,7 +1403,7 @@
           <a:p>
             <a:fld id="{2C3F5B8C-C339-43AD-9401-4981FE7E4CA6}" type="datetimeFigureOut">
               <a:rPr lang="en-US" smtClean="0"/>
-              <a:t>9/5/2021</a:t>
+              <a:t>9/12/2021</a:t>
             </a:fld>
             <a:endParaRPr lang="en-US"/>
           </a:p>
@@ -1810,7 +1815,7 @@
           <a:p>
             <a:fld id="{2C3F5B8C-C339-43AD-9401-4981FE7E4CA6}" type="datetimeFigureOut">
               <a:rPr lang="en-US" smtClean="0"/>
-              <a:t>9/5/2021</a:t>
+              <a:t>9/12/2021</a:t>
             </a:fld>
             <a:endParaRPr lang="en-US"/>
           </a:p>
@@ -1951,7 +1956,7 @@
           <a:p>
             <a:fld id="{2C3F5B8C-C339-43AD-9401-4981FE7E4CA6}" type="datetimeFigureOut">
               <a:rPr lang="en-US" smtClean="0"/>
-              <a:t>9/5/2021</a:t>
+              <a:t>9/12/2021</a:t>
             </a:fld>
             <a:endParaRPr lang="en-US"/>
           </a:p>
@@ -2064,7 +2069,7 @@
           <a:p>
             <a:fld id="{2C3F5B8C-C339-43AD-9401-4981FE7E4CA6}" type="datetimeFigureOut">
               <a:rPr lang="en-US" smtClean="0"/>
-              <a:t>9/5/2021</a:t>
+              <a:t>9/12/2021</a:t>
             </a:fld>
             <a:endParaRPr lang="en-US"/>
           </a:p>
@@ -2375,7 +2380,7 @@
           <a:p>
             <a:fld id="{2C3F5B8C-C339-43AD-9401-4981FE7E4CA6}" type="datetimeFigureOut">
               <a:rPr lang="en-US" smtClean="0"/>
-              <a:t>9/5/2021</a:t>
+              <a:t>9/12/2021</a:t>
             </a:fld>
             <a:endParaRPr lang="en-US"/>
           </a:p>
@@ -2663,7 +2668,7 @@
           <a:p>
             <a:fld id="{2C3F5B8C-C339-43AD-9401-4981FE7E4CA6}" type="datetimeFigureOut">
               <a:rPr lang="en-US" smtClean="0"/>
-              <a:t>9/5/2021</a:t>
+              <a:t>9/12/2021</a:t>
             </a:fld>
             <a:endParaRPr lang="en-US"/>
           </a:p>
@@ -2904,7 +2909,7 @@
           <a:p>
             <a:fld id="{2C3F5B8C-C339-43AD-9401-4981FE7E4CA6}" type="datetimeFigureOut">
               <a:rPr lang="en-US" smtClean="0"/>
-              <a:t>9/5/2021</a:t>
+              <a:t>9/12/2021</a:t>
             </a:fld>
             <a:endParaRPr lang="en-US"/>
           </a:p>
@@ -3356,8 +3361,123 @@
         </p:blipFill>
         <p:spPr>
           <a:xfrm>
-            <a:off x="4787563" y="2208987"/>
+            <a:off x="1729116" y="2390431"/>
             <a:ext cx="2082690" cy="2077137"/>
+          </a:xfrm>
+          <a:prstGeom prst="rect">
+            <a:avLst/>
+          </a:prstGeom>
+        </p:spPr>
+      </p:pic>
+      <p:pic>
+        <p:nvPicPr>
+          <p:cNvPr id="3" name="Picture 2">
+            <a:extLst>
+              <a:ext uri="{FF2B5EF4-FFF2-40B4-BE49-F238E27FC236}">
+                <a16:creationId xmlns:a16="http://schemas.microsoft.com/office/drawing/2014/main" id="{953CF9F2-F206-4500-ABEB-5968FF649E1D}"/>
+              </a:ext>
+            </a:extLst>
+          </p:cNvPr>
+          <p:cNvPicPr>
+            <a:picLocks noChangeAspect="1"/>
+          </p:cNvPicPr>
+          <p:nvPr/>
+        </p:nvPicPr>
+        <p:blipFill>
+          <a:blip r:embed="rId3">
+            <a:extLst>
+              <a:ext uri="{28A0092B-C50C-407E-A947-70E740481C1C}">
+                <a14:useLocalDpi xmlns:a14="http://schemas.microsoft.com/office/drawing/2010/main" val="0"/>
+              </a:ext>
+            </a:extLst>
+          </a:blip>
+          <a:stretch>
+            <a:fillRect/>
+          </a:stretch>
+        </p:blipFill>
+        <p:spPr>
+          <a:xfrm>
+            <a:off x="10431416" y="-7610168"/>
+            <a:ext cx="10284943" cy="6858000"/>
+          </a:xfrm>
+          <a:prstGeom prst="rect">
+            <a:avLst/>
+          </a:prstGeom>
+        </p:spPr>
+      </p:pic>
+      <p:pic>
+        <p:nvPicPr>
+          <p:cNvPr id="5" name="Picture 4">
+            <a:extLst>
+              <a:ext uri="{FF2B5EF4-FFF2-40B4-BE49-F238E27FC236}">
+                <a16:creationId xmlns:a16="http://schemas.microsoft.com/office/drawing/2014/main" id="{C6FD499B-C32F-477A-8970-9A935B69C07B}"/>
+              </a:ext>
+            </a:extLst>
+          </p:cNvPr>
+          <p:cNvPicPr>
+            <a:picLocks noChangeAspect="1"/>
+          </p:cNvPicPr>
+          <p:nvPr/>
+        </p:nvPicPr>
+        <p:blipFill>
+          <a:blip r:embed="rId4">
+            <a:duotone>
+              <a:prstClr val="black"/>
+              <a:schemeClr val="accent5">
+                <a:tint val="45000"/>
+                <a:satMod val="400000"/>
+              </a:schemeClr>
+            </a:duotone>
+            <a:extLst>
+              <a:ext uri="{28A0092B-C50C-407E-A947-70E740481C1C}">
+                <a14:useLocalDpi xmlns:a14="http://schemas.microsoft.com/office/drawing/2010/main" val="0"/>
+              </a:ext>
+            </a:extLst>
+          </a:blip>
+          <a:stretch>
+            <a:fillRect/>
+          </a:stretch>
+        </p:blipFill>
+        <p:spPr>
+          <a:xfrm>
+            <a:off x="10431416" y="6858000"/>
+            <a:ext cx="10283915" cy="6858000"/>
+          </a:xfrm>
+          <a:prstGeom prst="rect">
+            <a:avLst/>
+          </a:prstGeom>
+        </p:spPr>
+      </p:pic>
+      <p:pic>
+        <p:nvPicPr>
+          <p:cNvPr id="7" name="Picture 6">
+            <a:extLst>
+              <a:ext uri="{FF2B5EF4-FFF2-40B4-BE49-F238E27FC236}">
+                <a16:creationId xmlns:a16="http://schemas.microsoft.com/office/drawing/2014/main" id="{565BC59F-DFE6-4663-9E06-1044090EED16}"/>
+              </a:ext>
+            </a:extLst>
+          </p:cNvPr>
+          <p:cNvPicPr>
+            <a:picLocks noChangeAspect="1"/>
+          </p:cNvPicPr>
+          <p:nvPr/>
+        </p:nvPicPr>
+        <p:blipFill>
+          <a:blip r:embed="rId4">
+            <a:extLst>
+              <a:ext uri="{28A0092B-C50C-407E-A947-70E740481C1C}">
+                <a14:useLocalDpi xmlns:a14="http://schemas.microsoft.com/office/drawing/2010/main" val="0"/>
+              </a:ext>
+            </a:extLst>
+          </a:blip>
+          <a:stretch>
+            <a:fillRect/>
+          </a:stretch>
+        </p:blipFill>
+        <p:spPr>
+          <a:xfrm>
+            <a:off x="10431417" y="-238125"/>
+            <a:ext cx="10283915" cy="6858000"/>
           </a:xfrm>
           <a:prstGeom prst="rect">
             <a:avLst/>

</xml_diff>